<commit_message>
adjust presentation and resumo.md
</commit_message>
<xml_diff>
--- a/FelipeDrumm_FernandoCipriano_LuisFelipeBorsoi_GB.pptx
+++ b/FelipeDrumm_FernandoCipriano_LuisFelipeBorsoi_GB.pptx
@@ -19503,7 +19503,7 @@
         <p:spPr>
           <a:xfrm>
             <a:off x="246490" y="911282"/>
-            <a:ext cx="8058524" cy="3539430"/>
+            <a:ext cx="8058524" cy="3754874"/>
           </a:xfrm>
           <a:prstGeom prst="rect">
             <a:avLst/>
@@ -19543,172 +19543,17 @@
               </a:rPr>
               <a:t> da demo: </a:t>
             </a:r>
-          </a:p>
-          <a:p>
-            <a:pPr marL="285750" indent="-285750">
-              <a:spcAft>
-                <a:spcPts val="1200"/>
-              </a:spcAft>
-              <a:buFont typeface="Arial" panose="020B0604020202020204" pitchFamily="34" charset="0"/>
-              <a:buChar char="•"/>
-            </a:pPr>
-            <a:r>
-              <a:rPr lang="en-US" dirty="0">
-                <a:solidFill>
-                  <a:schemeClr val="tx1"/>
-                </a:solidFill>
-                <a:latin typeface="Roboto" panose="02000000000000000000" pitchFamily="2" charset="0"/>
-                <a:ea typeface="Roboto" panose="02000000000000000000" pitchFamily="2" charset="0"/>
-              </a:rPr>
-              <a:t>Docker e Kubernetes </a:t>
-            </a:r>
-            <a:r>
-              <a:rPr lang="en-US" dirty="0" err="1">
-                <a:solidFill>
-                  <a:schemeClr val="tx1"/>
-                </a:solidFill>
-                <a:latin typeface="Roboto" panose="02000000000000000000" pitchFamily="2" charset="0"/>
-                <a:ea typeface="Roboto" panose="02000000000000000000" pitchFamily="2" charset="0"/>
-              </a:rPr>
-              <a:t>são</a:t>
-            </a:r>
-            <a:r>
-              <a:rPr lang="en-US" dirty="0">
-                <a:solidFill>
-                  <a:schemeClr val="tx1"/>
-                </a:solidFill>
-                <a:latin typeface="Roboto" panose="02000000000000000000" pitchFamily="2" charset="0"/>
-                <a:ea typeface="Roboto" panose="02000000000000000000" pitchFamily="2" charset="0"/>
-              </a:rPr>
-              <a:t> as ferramentas </a:t>
-            </a:r>
-            <a:r>
-              <a:rPr lang="en-US" dirty="0" err="1">
-                <a:solidFill>
-                  <a:schemeClr val="tx1"/>
-                </a:solidFill>
-                <a:latin typeface="Roboto" panose="02000000000000000000" pitchFamily="2" charset="0"/>
-                <a:ea typeface="Roboto" panose="02000000000000000000" pitchFamily="2" charset="0"/>
-              </a:rPr>
-              <a:t>mais</a:t>
-            </a:r>
-            <a:r>
-              <a:rPr lang="en-US" dirty="0">
-                <a:solidFill>
-                  <a:schemeClr val="tx1"/>
-                </a:solidFill>
-                <a:latin typeface="Roboto" panose="02000000000000000000" pitchFamily="2" charset="0"/>
-                <a:ea typeface="Roboto" panose="02000000000000000000" pitchFamily="2" charset="0"/>
-              </a:rPr>
-              <a:t> </a:t>
-            </a:r>
-            <a:r>
-              <a:rPr lang="en-US" dirty="0" err="1">
-                <a:solidFill>
-                  <a:schemeClr val="tx1"/>
-                </a:solidFill>
-                <a:latin typeface="Roboto" panose="02000000000000000000" pitchFamily="2" charset="0"/>
-                <a:ea typeface="Roboto" panose="02000000000000000000" pitchFamily="2" charset="0"/>
-              </a:rPr>
-              <a:t>famosas</a:t>
-            </a:r>
-            <a:r>
-              <a:rPr lang="en-US" dirty="0">
-                <a:solidFill>
-                  <a:schemeClr val="tx1"/>
-                </a:solidFill>
-                <a:latin typeface="Roboto" panose="02000000000000000000" pitchFamily="2" charset="0"/>
-                <a:ea typeface="Roboto" panose="02000000000000000000" pitchFamily="2" charset="0"/>
-              </a:rPr>
-              <a:t> para </a:t>
-            </a:r>
-            <a:r>
-              <a:rPr lang="en-US" dirty="0" err="1">
-                <a:solidFill>
-                  <a:schemeClr val="tx1"/>
-                </a:solidFill>
-                <a:latin typeface="Roboto" panose="02000000000000000000" pitchFamily="2" charset="0"/>
-                <a:ea typeface="Roboto" panose="02000000000000000000" pitchFamily="2" charset="0"/>
-              </a:rPr>
-              <a:t>trabalhar</a:t>
-            </a:r>
-            <a:r>
-              <a:rPr lang="en-US" dirty="0">
-                <a:solidFill>
-                  <a:schemeClr val="tx1"/>
-                </a:solidFill>
-                <a:latin typeface="Roboto" panose="02000000000000000000" pitchFamily="2" charset="0"/>
-                <a:ea typeface="Roboto" panose="02000000000000000000" pitchFamily="2" charset="0"/>
-              </a:rPr>
-              <a:t> com containers, mas </a:t>
-            </a:r>
-            <a:r>
-              <a:rPr lang="en-US" dirty="0" err="1">
-                <a:solidFill>
-                  <a:schemeClr val="tx1"/>
-                </a:solidFill>
-                <a:latin typeface="Roboto" panose="02000000000000000000" pitchFamily="2" charset="0"/>
-                <a:ea typeface="Roboto" panose="02000000000000000000" pitchFamily="2" charset="0"/>
-              </a:rPr>
-              <a:t>existem</a:t>
-            </a:r>
-            <a:r>
-              <a:rPr lang="en-US" dirty="0">
-                <a:solidFill>
-                  <a:schemeClr val="tx1"/>
-                </a:solidFill>
-                <a:latin typeface="Roboto" panose="02000000000000000000" pitchFamily="2" charset="0"/>
-                <a:ea typeface="Roboto" panose="02000000000000000000" pitchFamily="2" charset="0"/>
-              </a:rPr>
-              <a:t> </a:t>
-            </a:r>
-            <a:r>
-              <a:rPr lang="en-US" dirty="0" err="1">
-                <a:solidFill>
-                  <a:schemeClr val="tx1"/>
-                </a:solidFill>
-                <a:latin typeface="Roboto" panose="02000000000000000000" pitchFamily="2" charset="0"/>
-                <a:ea typeface="Roboto" panose="02000000000000000000" pitchFamily="2" charset="0"/>
-              </a:rPr>
-              <a:t>muitas</a:t>
-            </a:r>
-            <a:r>
-              <a:rPr lang="en-US" dirty="0">
-                <a:solidFill>
-                  <a:schemeClr val="tx1"/>
-                </a:solidFill>
-                <a:latin typeface="Roboto" panose="02000000000000000000" pitchFamily="2" charset="0"/>
-                <a:ea typeface="Roboto" panose="02000000000000000000" pitchFamily="2" charset="0"/>
-              </a:rPr>
-              <a:t> </a:t>
-            </a:r>
-            <a:r>
-              <a:rPr lang="en-US" dirty="0" err="1">
-                <a:solidFill>
-                  <a:schemeClr val="tx1"/>
-                </a:solidFill>
-                <a:latin typeface="Roboto" panose="02000000000000000000" pitchFamily="2" charset="0"/>
-                <a:ea typeface="Roboto" panose="02000000000000000000" pitchFamily="2" charset="0"/>
-              </a:rPr>
-              <a:t>outras</a:t>
-            </a:r>
-            <a:r>
-              <a:rPr lang="en-US" dirty="0">
-                <a:solidFill>
-                  <a:schemeClr val="tx1"/>
-                </a:solidFill>
-                <a:latin typeface="Roboto" panose="02000000000000000000" pitchFamily="2" charset="0"/>
-                <a:ea typeface="Roboto" panose="02000000000000000000" pitchFamily="2" charset="0"/>
-              </a:rPr>
-              <a:t>;</a:t>
-            </a:r>
-          </a:p>
-          <a:p>
-            <a:pPr>
-              <a:spcAft>
-                <a:spcPts val="1200"/>
-              </a:spcAft>
-            </a:pPr>
+            <a:r>
+              <a:rPr lang="en-US" dirty="0">
+                <a:solidFill>
+                  <a:schemeClr val="tx1"/>
+                </a:solidFill>
+                <a:latin typeface="Roboto" panose="02000000000000000000" pitchFamily="2" charset="0"/>
+                <a:ea typeface="Roboto" panose="02000000000000000000" pitchFamily="2" charset="0"/>
+                <a:hlinkClick r:id="rId3"/>
+              </a:rPr>
+              <a:t>https://github.com/luisfelipe998/docker-kubernetes-arq-com-2</a:t>
+            </a:r>
             <a:endParaRPr lang="en-US" dirty="0">
               <a:solidFill>
                 <a:schemeClr val="tx1"/>
@@ -19733,57 +19578,37 @@
                 <a:latin typeface="Roboto" panose="02000000000000000000" pitchFamily="2" charset="0"/>
                 <a:ea typeface="Roboto" panose="02000000000000000000" pitchFamily="2" charset="0"/>
               </a:rPr>
-              <a:t>Containers </a:t>
-            </a:r>
-            <a:r>
-              <a:rPr lang="en-US" dirty="0" err="1">
-                <a:solidFill>
-                  <a:schemeClr val="tx1"/>
-                </a:solidFill>
-                <a:latin typeface="Roboto" panose="02000000000000000000" pitchFamily="2" charset="0"/>
-                <a:ea typeface="Roboto" panose="02000000000000000000" pitchFamily="2" charset="0"/>
-              </a:rPr>
-              <a:t>cumprem</a:t>
-            </a:r>
-            <a:r>
-              <a:rPr lang="en-US" dirty="0">
-                <a:solidFill>
-                  <a:schemeClr val="tx1"/>
-                </a:solidFill>
-                <a:latin typeface="Roboto" panose="02000000000000000000" pitchFamily="2" charset="0"/>
-                <a:ea typeface="Roboto" panose="02000000000000000000" pitchFamily="2" charset="0"/>
-              </a:rPr>
-              <a:t> um </a:t>
-            </a:r>
-            <a:r>
-              <a:rPr lang="en-US" dirty="0" err="1">
-                <a:solidFill>
-                  <a:schemeClr val="tx1"/>
-                </a:solidFill>
-                <a:latin typeface="Roboto" panose="02000000000000000000" pitchFamily="2" charset="0"/>
-                <a:ea typeface="Roboto" panose="02000000000000000000" pitchFamily="2" charset="0"/>
-              </a:rPr>
-              <a:t>papel</a:t>
-            </a:r>
-            <a:r>
-              <a:rPr lang="en-US" dirty="0">
-                <a:solidFill>
-                  <a:schemeClr val="tx1"/>
-                </a:solidFill>
-                <a:latin typeface="Roboto" panose="02000000000000000000" pitchFamily="2" charset="0"/>
-                <a:ea typeface="Roboto" panose="02000000000000000000" pitchFamily="2" charset="0"/>
-              </a:rPr>
-              <a:t> fundamental </a:t>
-            </a:r>
-            <a:r>
-              <a:rPr lang="en-US" dirty="0" err="1">
-                <a:solidFill>
-                  <a:schemeClr val="tx1"/>
-                </a:solidFill>
-                <a:latin typeface="Roboto" panose="02000000000000000000" pitchFamily="2" charset="0"/>
-                <a:ea typeface="Roboto" panose="02000000000000000000" pitchFamily="2" charset="0"/>
-              </a:rPr>
-              <a:t>na</a:t>
+              <a:t>Docker e Kubernetes </a:t>
+            </a:r>
+            <a:r>
+              <a:rPr lang="en-US" dirty="0" err="1">
+                <a:solidFill>
+                  <a:schemeClr val="tx1"/>
+                </a:solidFill>
+                <a:latin typeface="Roboto" panose="02000000000000000000" pitchFamily="2" charset="0"/>
+                <a:ea typeface="Roboto" panose="02000000000000000000" pitchFamily="2" charset="0"/>
+              </a:rPr>
+              <a:t>são</a:t>
+            </a:r>
+            <a:r>
+              <a:rPr lang="en-US" dirty="0">
+                <a:solidFill>
+                  <a:schemeClr val="tx1"/>
+                </a:solidFill>
+                <a:latin typeface="Roboto" panose="02000000000000000000" pitchFamily="2" charset="0"/>
+                <a:ea typeface="Roboto" panose="02000000000000000000" pitchFamily="2" charset="0"/>
+              </a:rPr>
+              <a:t> as ferramentas </a:t>
+            </a:r>
+            <a:r>
+              <a:rPr lang="en-US" dirty="0" err="1">
+                <a:solidFill>
+                  <a:schemeClr val="tx1"/>
+                </a:solidFill>
+                <a:latin typeface="Roboto" panose="02000000000000000000" pitchFamily="2" charset="0"/>
+                <a:ea typeface="Roboto" panose="02000000000000000000" pitchFamily="2" charset="0"/>
+              </a:rPr>
+              <a:t>mais</a:t>
             </a:r>
             <a:r>
               <a:rPr lang="en-US" dirty="0">
@@ -19803,7 +19628,47 @@
                 <a:latin typeface="Roboto" panose="02000000000000000000" pitchFamily="2" charset="0"/>
                 <a:ea typeface="Roboto" panose="02000000000000000000" pitchFamily="2" charset="0"/>
               </a:rPr>
-              <a:t>computação</a:t>
+              <a:t>famosas</a:t>
+            </a:r>
+            <a:r>
+              <a:rPr lang="en-US" dirty="0">
+                <a:solidFill>
+                  <a:schemeClr val="tx1"/>
+                </a:solidFill>
+                <a:latin typeface="Roboto" panose="02000000000000000000" pitchFamily="2" charset="0"/>
+                <a:ea typeface="Roboto" panose="02000000000000000000" pitchFamily="2" charset="0"/>
+              </a:rPr>
+              <a:t> para </a:t>
+            </a:r>
+            <a:r>
+              <a:rPr lang="en-US" dirty="0" err="1">
+                <a:solidFill>
+                  <a:schemeClr val="tx1"/>
+                </a:solidFill>
+                <a:latin typeface="Roboto" panose="02000000000000000000" pitchFamily="2" charset="0"/>
+                <a:ea typeface="Roboto" panose="02000000000000000000" pitchFamily="2" charset="0"/>
+              </a:rPr>
+              <a:t>trabalhar</a:t>
+            </a:r>
+            <a:r>
+              <a:rPr lang="en-US" dirty="0">
+                <a:solidFill>
+                  <a:schemeClr val="tx1"/>
+                </a:solidFill>
+                <a:latin typeface="Roboto" panose="02000000000000000000" pitchFamily="2" charset="0"/>
+                <a:ea typeface="Roboto" panose="02000000000000000000" pitchFamily="2" charset="0"/>
+              </a:rPr>
+              <a:t> com containers, mas </a:t>
+            </a:r>
+            <a:r>
+              <a:rPr lang="en-US" dirty="0" err="1">
+                <a:solidFill>
+                  <a:schemeClr val="tx1"/>
+                </a:solidFill>
+                <a:latin typeface="Roboto" panose="02000000000000000000" pitchFamily="2" charset="0"/>
+                <a:ea typeface="Roboto" panose="02000000000000000000" pitchFamily="2" charset="0"/>
+              </a:rPr>
+              <a:t>existem</a:t>
             </a:r>
             <a:r>
               <a:rPr lang="en-US" dirty="0">
@@ -19823,27 +19688,7 @@
                 <a:latin typeface="Roboto" panose="02000000000000000000" pitchFamily="2" charset="0"/>
                 <a:ea typeface="Roboto" panose="02000000000000000000" pitchFamily="2" charset="0"/>
               </a:rPr>
-              <a:t>distribuída</a:t>
-            </a:r>
-            <a:r>
-              <a:rPr lang="en-US" dirty="0">
-                <a:solidFill>
-                  <a:schemeClr val="tx1"/>
-                </a:solidFill>
-                <a:latin typeface="Roboto" panose="02000000000000000000" pitchFamily="2" charset="0"/>
-                <a:ea typeface="Roboto" panose="02000000000000000000" pitchFamily="2" charset="0"/>
-              </a:rPr>
-              <a:t> e </a:t>
-            </a:r>
-            <a:r>
-              <a:rPr lang="en-US" dirty="0" err="1">
-                <a:solidFill>
-                  <a:schemeClr val="tx1"/>
-                </a:solidFill>
-                <a:latin typeface="Roboto" panose="02000000000000000000" pitchFamily="2" charset="0"/>
-                <a:ea typeface="Roboto" panose="02000000000000000000" pitchFamily="2" charset="0"/>
-              </a:rPr>
-              <a:t>na</a:t>
+              <a:t>muitas</a:t>
             </a:r>
             <a:r>
               <a:rPr lang="en-US" dirty="0">
@@ -19863,27 +19708,7 @@
                 <a:latin typeface="Roboto" panose="02000000000000000000" pitchFamily="2" charset="0"/>
                 <a:ea typeface="Roboto" panose="02000000000000000000" pitchFamily="2" charset="0"/>
               </a:rPr>
-              <a:t>nuvem</a:t>
-            </a:r>
-            <a:r>
-              <a:rPr lang="en-US" dirty="0">
-                <a:solidFill>
-                  <a:schemeClr val="tx1"/>
-                </a:solidFill>
-                <a:latin typeface="Roboto" panose="02000000000000000000" pitchFamily="2" charset="0"/>
-                <a:ea typeface="Roboto" panose="02000000000000000000" pitchFamily="2" charset="0"/>
-              </a:rPr>
-              <a:t> </a:t>
-            </a:r>
-            <a:r>
-              <a:rPr lang="en-US" dirty="0" err="1">
-                <a:solidFill>
-                  <a:schemeClr val="tx1"/>
-                </a:solidFill>
-                <a:latin typeface="Roboto" panose="02000000000000000000" pitchFamily="2" charset="0"/>
-                <a:ea typeface="Roboto" panose="02000000000000000000" pitchFamily="2" charset="0"/>
-              </a:rPr>
-              <a:t>atualmente</a:t>
+              <a:t>outras</a:t>
             </a:r>
             <a:r>
               <a:rPr lang="en-US" dirty="0">
@@ -19922,47 +19747,47 @@
                 <a:latin typeface="Roboto" panose="02000000000000000000" pitchFamily="2" charset="0"/>
                 <a:ea typeface="Roboto" panose="02000000000000000000" pitchFamily="2" charset="0"/>
               </a:rPr>
-              <a:t>facilitam</a:t>
-            </a:r>
-            <a:r>
-              <a:rPr lang="en-US" dirty="0">
-                <a:solidFill>
-                  <a:schemeClr val="tx1"/>
-                </a:solidFill>
-                <a:latin typeface="Roboto" panose="02000000000000000000" pitchFamily="2" charset="0"/>
-                <a:ea typeface="Roboto" panose="02000000000000000000" pitchFamily="2" charset="0"/>
-              </a:rPr>
-              <a:t> o </a:t>
-            </a:r>
-            <a:r>
-              <a:rPr lang="en-US" dirty="0" err="1">
-                <a:solidFill>
-                  <a:schemeClr val="tx1"/>
-                </a:solidFill>
-                <a:latin typeface="Roboto" panose="02000000000000000000" pitchFamily="2" charset="0"/>
-                <a:ea typeface="Roboto" panose="02000000000000000000" pitchFamily="2" charset="0"/>
-              </a:rPr>
-              <a:t>desenvolvimento</a:t>
-            </a:r>
-            <a:r>
-              <a:rPr lang="en-US" dirty="0">
-                <a:solidFill>
-                  <a:schemeClr val="tx1"/>
-                </a:solidFill>
-                <a:latin typeface="Roboto" panose="02000000000000000000" pitchFamily="2" charset="0"/>
-                <a:ea typeface="Roboto" panose="02000000000000000000" pitchFamily="2" charset="0"/>
-              </a:rPr>
-              <a:t>, </a:t>
-            </a:r>
-            <a:r>
-              <a:rPr lang="en-US" dirty="0" err="1">
-                <a:solidFill>
-                  <a:schemeClr val="tx1"/>
-                </a:solidFill>
-                <a:latin typeface="Roboto" panose="02000000000000000000" pitchFamily="2" charset="0"/>
-                <a:ea typeface="Roboto" panose="02000000000000000000" pitchFamily="2" charset="0"/>
-              </a:rPr>
-              <a:t>sendo</a:t>
+              <a:t>cumprem</a:t>
+            </a:r>
+            <a:r>
+              <a:rPr lang="en-US" dirty="0">
+                <a:solidFill>
+                  <a:schemeClr val="tx1"/>
+                </a:solidFill>
+                <a:latin typeface="Roboto" panose="02000000000000000000" pitchFamily="2" charset="0"/>
+                <a:ea typeface="Roboto" panose="02000000000000000000" pitchFamily="2" charset="0"/>
+              </a:rPr>
+              <a:t> um </a:t>
+            </a:r>
+            <a:r>
+              <a:rPr lang="en-US" dirty="0" err="1">
+                <a:solidFill>
+                  <a:schemeClr val="tx1"/>
+                </a:solidFill>
+                <a:latin typeface="Roboto" panose="02000000000000000000" pitchFamily="2" charset="0"/>
+                <a:ea typeface="Roboto" panose="02000000000000000000" pitchFamily="2" charset="0"/>
+              </a:rPr>
+              <a:t>papel</a:t>
+            </a:r>
+            <a:r>
+              <a:rPr lang="en-US" dirty="0">
+                <a:solidFill>
+                  <a:schemeClr val="tx1"/>
+                </a:solidFill>
+                <a:latin typeface="Roboto" panose="02000000000000000000" pitchFamily="2" charset="0"/>
+                <a:ea typeface="Roboto" panose="02000000000000000000" pitchFamily="2" charset="0"/>
+              </a:rPr>
+              <a:t> fundamental </a:t>
+            </a:r>
+            <a:r>
+              <a:rPr lang="en-US" dirty="0" err="1">
+                <a:solidFill>
+                  <a:schemeClr val="tx1"/>
+                </a:solidFill>
+                <a:latin typeface="Roboto" panose="02000000000000000000" pitchFamily="2" charset="0"/>
+                <a:ea typeface="Roboto" panose="02000000000000000000" pitchFamily="2" charset="0"/>
+              </a:rPr>
+              <a:t>na</a:t>
             </a:r>
             <a:r>
               <a:rPr lang="en-US" dirty="0">
@@ -19982,7 +19807,7 @@
                 <a:latin typeface="Roboto" panose="02000000000000000000" pitchFamily="2" charset="0"/>
                 <a:ea typeface="Roboto" panose="02000000000000000000" pitchFamily="2" charset="0"/>
               </a:rPr>
-              <a:t>possível</a:t>
+              <a:t>computação</a:t>
             </a:r>
             <a:r>
               <a:rPr lang="en-US" dirty="0">
@@ -20002,27 +19827,27 @@
                 <a:latin typeface="Roboto" panose="02000000000000000000" pitchFamily="2" charset="0"/>
                 <a:ea typeface="Roboto" panose="02000000000000000000" pitchFamily="2" charset="0"/>
               </a:rPr>
-              <a:t>portar</a:t>
-            </a:r>
-            <a:r>
-              <a:rPr lang="en-US" dirty="0">
-                <a:solidFill>
-                  <a:schemeClr val="tx1"/>
-                </a:solidFill>
-                <a:latin typeface="Roboto" panose="02000000000000000000" pitchFamily="2" charset="0"/>
-                <a:ea typeface="Roboto" panose="02000000000000000000" pitchFamily="2" charset="0"/>
-              </a:rPr>
-              <a:t> a </a:t>
-            </a:r>
-            <a:r>
-              <a:rPr lang="en-US" dirty="0" err="1">
-                <a:solidFill>
-                  <a:schemeClr val="tx1"/>
-                </a:solidFill>
-                <a:latin typeface="Roboto" panose="02000000000000000000" pitchFamily="2" charset="0"/>
-                <a:ea typeface="Roboto" panose="02000000000000000000" pitchFamily="2" charset="0"/>
-              </a:rPr>
-              <a:t>aplicação</a:t>
+              <a:t>distribuída</a:t>
+            </a:r>
+            <a:r>
+              <a:rPr lang="en-US" dirty="0">
+                <a:solidFill>
+                  <a:schemeClr val="tx1"/>
+                </a:solidFill>
+                <a:latin typeface="Roboto" panose="02000000000000000000" pitchFamily="2" charset="0"/>
+                <a:ea typeface="Roboto" panose="02000000000000000000" pitchFamily="2" charset="0"/>
+              </a:rPr>
+              <a:t> e </a:t>
+            </a:r>
+            <a:r>
+              <a:rPr lang="en-US" dirty="0" err="1">
+                <a:solidFill>
+                  <a:schemeClr val="tx1"/>
+                </a:solidFill>
+                <a:latin typeface="Roboto" panose="02000000000000000000" pitchFamily="2" charset="0"/>
+                <a:ea typeface="Roboto" panose="02000000000000000000" pitchFamily="2" charset="0"/>
+              </a:rPr>
+              <a:t>na</a:t>
             </a:r>
             <a:r>
               <a:rPr lang="en-US" dirty="0">
@@ -20042,7 +19867,7 @@
                 <a:latin typeface="Roboto" panose="02000000000000000000" pitchFamily="2" charset="0"/>
                 <a:ea typeface="Roboto" panose="02000000000000000000" pitchFamily="2" charset="0"/>
               </a:rPr>
-              <a:t>pra</a:t>
+              <a:t>nuvem</a:t>
             </a:r>
             <a:r>
               <a:rPr lang="en-US" dirty="0">
@@ -20062,87 +19887,7 @@
                 <a:latin typeface="Roboto" panose="02000000000000000000" pitchFamily="2" charset="0"/>
                 <a:ea typeface="Roboto" panose="02000000000000000000" pitchFamily="2" charset="0"/>
               </a:rPr>
-              <a:t>diferentes</a:t>
-            </a:r>
-            <a:r>
-              <a:rPr lang="en-US" dirty="0">
-                <a:solidFill>
-                  <a:schemeClr val="tx1"/>
-                </a:solidFill>
-                <a:latin typeface="Roboto" panose="02000000000000000000" pitchFamily="2" charset="0"/>
-                <a:ea typeface="Roboto" panose="02000000000000000000" pitchFamily="2" charset="0"/>
-              </a:rPr>
-              <a:t> </a:t>
-            </a:r>
-            <a:r>
-              <a:rPr lang="en-US" dirty="0" err="1">
-                <a:solidFill>
-                  <a:schemeClr val="tx1"/>
-                </a:solidFill>
-                <a:latin typeface="Roboto" panose="02000000000000000000" pitchFamily="2" charset="0"/>
-                <a:ea typeface="Roboto" panose="02000000000000000000" pitchFamily="2" charset="0"/>
-              </a:rPr>
-              <a:t>máquinas</a:t>
-            </a:r>
-            <a:r>
-              <a:rPr lang="en-US" dirty="0">
-                <a:solidFill>
-                  <a:schemeClr val="tx1"/>
-                </a:solidFill>
-                <a:latin typeface="Roboto" panose="02000000000000000000" pitchFamily="2" charset="0"/>
-                <a:ea typeface="Roboto" panose="02000000000000000000" pitchFamily="2" charset="0"/>
-              </a:rPr>
-              <a:t> </a:t>
-            </a:r>
-            <a:r>
-              <a:rPr lang="en-US" dirty="0" err="1">
-                <a:solidFill>
-                  <a:schemeClr val="tx1"/>
-                </a:solidFill>
-                <a:latin typeface="Roboto" panose="02000000000000000000" pitchFamily="2" charset="0"/>
-                <a:ea typeface="Roboto" panose="02000000000000000000" pitchFamily="2" charset="0"/>
-              </a:rPr>
-              <a:t>garantindo</a:t>
-            </a:r>
-            <a:r>
-              <a:rPr lang="en-US" dirty="0">
-                <a:solidFill>
-                  <a:schemeClr val="tx1"/>
-                </a:solidFill>
-                <a:latin typeface="Roboto" panose="02000000000000000000" pitchFamily="2" charset="0"/>
-                <a:ea typeface="Roboto" panose="02000000000000000000" pitchFamily="2" charset="0"/>
-              </a:rPr>
-              <a:t> o </a:t>
-            </a:r>
-            <a:r>
-              <a:rPr lang="en-US" dirty="0" err="1">
-                <a:solidFill>
-                  <a:schemeClr val="tx1"/>
-                </a:solidFill>
-                <a:latin typeface="Roboto" panose="02000000000000000000" pitchFamily="2" charset="0"/>
-                <a:ea typeface="Roboto" panose="02000000000000000000" pitchFamily="2" charset="0"/>
-              </a:rPr>
-              <a:t>mesmo</a:t>
-            </a:r>
-            <a:r>
-              <a:rPr lang="en-US" dirty="0">
-                <a:solidFill>
-                  <a:schemeClr val="tx1"/>
-                </a:solidFill>
-                <a:latin typeface="Roboto" panose="02000000000000000000" pitchFamily="2" charset="0"/>
-                <a:ea typeface="Roboto" panose="02000000000000000000" pitchFamily="2" charset="0"/>
-              </a:rPr>
-              <a:t> </a:t>
-            </a:r>
-            <a:r>
-              <a:rPr lang="en-US" dirty="0" err="1">
-                <a:solidFill>
-                  <a:schemeClr val="tx1"/>
-                </a:solidFill>
-                <a:latin typeface="Roboto" panose="02000000000000000000" pitchFamily="2" charset="0"/>
-                <a:ea typeface="Roboto" panose="02000000000000000000" pitchFamily="2" charset="0"/>
-              </a:rPr>
-              <a:t>ambiente</a:t>
+              <a:t>atualmente</a:t>
             </a:r>
             <a:r>
               <a:rPr lang="en-US" dirty="0">
@@ -20171,6 +19916,265 @@
                 <a:latin typeface="Roboto" panose="02000000000000000000" pitchFamily="2" charset="0"/>
                 <a:ea typeface="Roboto" panose="02000000000000000000" pitchFamily="2" charset="0"/>
               </a:rPr>
+              <a:t>Containers </a:t>
+            </a:r>
+            <a:r>
+              <a:rPr lang="en-US" dirty="0" err="1">
+                <a:solidFill>
+                  <a:schemeClr val="tx1"/>
+                </a:solidFill>
+                <a:latin typeface="Roboto" panose="02000000000000000000" pitchFamily="2" charset="0"/>
+                <a:ea typeface="Roboto" panose="02000000000000000000" pitchFamily="2" charset="0"/>
+              </a:rPr>
+              <a:t>facilitam</a:t>
+            </a:r>
+            <a:r>
+              <a:rPr lang="en-US" dirty="0">
+                <a:solidFill>
+                  <a:schemeClr val="tx1"/>
+                </a:solidFill>
+                <a:latin typeface="Roboto" panose="02000000000000000000" pitchFamily="2" charset="0"/>
+                <a:ea typeface="Roboto" panose="02000000000000000000" pitchFamily="2" charset="0"/>
+              </a:rPr>
+              <a:t> o </a:t>
+            </a:r>
+            <a:r>
+              <a:rPr lang="en-US" dirty="0" err="1">
+                <a:solidFill>
+                  <a:schemeClr val="tx1"/>
+                </a:solidFill>
+                <a:latin typeface="Roboto" panose="02000000000000000000" pitchFamily="2" charset="0"/>
+                <a:ea typeface="Roboto" panose="02000000000000000000" pitchFamily="2" charset="0"/>
+              </a:rPr>
+              <a:t>desenvolvimento</a:t>
+            </a:r>
+            <a:r>
+              <a:rPr lang="en-US" dirty="0">
+                <a:solidFill>
+                  <a:schemeClr val="tx1"/>
+                </a:solidFill>
+                <a:latin typeface="Roboto" panose="02000000000000000000" pitchFamily="2" charset="0"/>
+                <a:ea typeface="Roboto" panose="02000000000000000000" pitchFamily="2" charset="0"/>
+              </a:rPr>
+              <a:t>, </a:t>
+            </a:r>
+            <a:r>
+              <a:rPr lang="en-US" dirty="0" err="1">
+                <a:solidFill>
+                  <a:schemeClr val="tx1"/>
+                </a:solidFill>
+                <a:latin typeface="Roboto" panose="02000000000000000000" pitchFamily="2" charset="0"/>
+                <a:ea typeface="Roboto" panose="02000000000000000000" pitchFamily="2" charset="0"/>
+              </a:rPr>
+              <a:t>sendo</a:t>
+            </a:r>
+            <a:r>
+              <a:rPr lang="en-US" dirty="0">
+                <a:solidFill>
+                  <a:schemeClr val="tx1"/>
+                </a:solidFill>
+                <a:latin typeface="Roboto" panose="02000000000000000000" pitchFamily="2" charset="0"/>
+                <a:ea typeface="Roboto" panose="02000000000000000000" pitchFamily="2" charset="0"/>
+              </a:rPr>
+              <a:t> </a:t>
+            </a:r>
+            <a:r>
+              <a:rPr lang="en-US" dirty="0" err="1">
+                <a:solidFill>
+                  <a:schemeClr val="tx1"/>
+                </a:solidFill>
+                <a:latin typeface="Roboto" panose="02000000000000000000" pitchFamily="2" charset="0"/>
+                <a:ea typeface="Roboto" panose="02000000000000000000" pitchFamily="2" charset="0"/>
+              </a:rPr>
+              <a:t>possível</a:t>
+            </a:r>
+            <a:r>
+              <a:rPr lang="en-US" dirty="0">
+                <a:solidFill>
+                  <a:schemeClr val="tx1"/>
+                </a:solidFill>
+                <a:latin typeface="Roboto" panose="02000000000000000000" pitchFamily="2" charset="0"/>
+                <a:ea typeface="Roboto" panose="02000000000000000000" pitchFamily="2" charset="0"/>
+              </a:rPr>
+              <a:t> </a:t>
+            </a:r>
+            <a:r>
+              <a:rPr lang="en-US" dirty="0" err="1">
+                <a:solidFill>
+                  <a:schemeClr val="tx1"/>
+                </a:solidFill>
+                <a:latin typeface="Roboto" panose="02000000000000000000" pitchFamily="2" charset="0"/>
+                <a:ea typeface="Roboto" panose="02000000000000000000" pitchFamily="2" charset="0"/>
+              </a:rPr>
+              <a:t>portar</a:t>
+            </a:r>
+            <a:r>
+              <a:rPr lang="en-US" dirty="0">
+                <a:solidFill>
+                  <a:schemeClr val="tx1"/>
+                </a:solidFill>
+                <a:latin typeface="Roboto" panose="02000000000000000000" pitchFamily="2" charset="0"/>
+                <a:ea typeface="Roboto" panose="02000000000000000000" pitchFamily="2" charset="0"/>
+              </a:rPr>
+              <a:t> a </a:t>
+            </a:r>
+            <a:r>
+              <a:rPr lang="en-US" dirty="0" err="1">
+                <a:solidFill>
+                  <a:schemeClr val="tx1"/>
+                </a:solidFill>
+                <a:latin typeface="Roboto" panose="02000000000000000000" pitchFamily="2" charset="0"/>
+                <a:ea typeface="Roboto" panose="02000000000000000000" pitchFamily="2" charset="0"/>
+              </a:rPr>
+              <a:t>aplicação</a:t>
+            </a:r>
+            <a:r>
+              <a:rPr lang="en-US" dirty="0">
+                <a:solidFill>
+                  <a:schemeClr val="tx1"/>
+                </a:solidFill>
+                <a:latin typeface="Roboto" panose="02000000000000000000" pitchFamily="2" charset="0"/>
+                <a:ea typeface="Roboto" panose="02000000000000000000" pitchFamily="2" charset="0"/>
+              </a:rPr>
+              <a:t> </a:t>
+            </a:r>
+            <a:r>
+              <a:rPr lang="en-US" dirty="0" err="1">
+                <a:solidFill>
+                  <a:schemeClr val="tx1"/>
+                </a:solidFill>
+                <a:latin typeface="Roboto" panose="02000000000000000000" pitchFamily="2" charset="0"/>
+                <a:ea typeface="Roboto" panose="02000000000000000000" pitchFamily="2" charset="0"/>
+              </a:rPr>
+              <a:t>pra</a:t>
+            </a:r>
+            <a:r>
+              <a:rPr lang="en-US" dirty="0">
+                <a:solidFill>
+                  <a:schemeClr val="tx1"/>
+                </a:solidFill>
+                <a:latin typeface="Roboto" panose="02000000000000000000" pitchFamily="2" charset="0"/>
+                <a:ea typeface="Roboto" panose="02000000000000000000" pitchFamily="2" charset="0"/>
+              </a:rPr>
+              <a:t> </a:t>
+            </a:r>
+            <a:r>
+              <a:rPr lang="en-US" dirty="0" err="1">
+                <a:solidFill>
+                  <a:schemeClr val="tx1"/>
+                </a:solidFill>
+                <a:latin typeface="Roboto" panose="02000000000000000000" pitchFamily="2" charset="0"/>
+                <a:ea typeface="Roboto" panose="02000000000000000000" pitchFamily="2" charset="0"/>
+              </a:rPr>
+              <a:t>diferentes</a:t>
+            </a:r>
+            <a:r>
+              <a:rPr lang="en-US" dirty="0">
+                <a:solidFill>
+                  <a:schemeClr val="tx1"/>
+                </a:solidFill>
+                <a:latin typeface="Roboto" panose="02000000000000000000" pitchFamily="2" charset="0"/>
+                <a:ea typeface="Roboto" panose="02000000000000000000" pitchFamily="2" charset="0"/>
+              </a:rPr>
+              <a:t> </a:t>
+            </a:r>
+            <a:r>
+              <a:rPr lang="en-US" dirty="0" err="1">
+                <a:solidFill>
+                  <a:schemeClr val="tx1"/>
+                </a:solidFill>
+                <a:latin typeface="Roboto" panose="02000000000000000000" pitchFamily="2" charset="0"/>
+                <a:ea typeface="Roboto" panose="02000000000000000000" pitchFamily="2" charset="0"/>
+              </a:rPr>
+              <a:t>máquinas</a:t>
+            </a:r>
+            <a:r>
+              <a:rPr lang="en-US" dirty="0">
+                <a:solidFill>
+                  <a:schemeClr val="tx1"/>
+                </a:solidFill>
+                <a:latin typeface="Roboto" panose="02000000000000000000" pitchFamily="2" charset="0"/>
+                <a:ea typeface="Roboto" panose="02000000000000000000" pitchFamily="2" charset="0"/>
+              </a:rPr>
+              <a:t> </a:t>
+            </a:r>
+            <a:r>
+              <a:rPr lang="en-US" dirty="0" err="1">
+                <a:solidFill>
+                  <a:schemeClr val="tx1"/>
+                </a:solidFill>
+                <a:latin typeface="Roboto" panose="02000000000000000000" pitchFamily="2" charset="0"/>
+                <a:ea typeface="Roboto" panose="02000000000000000000" pitchFamily="2" charset="0"/>
+              </a:rPr>
+              <a:t>garantindo</a:t>
+            </a:r>
+            <a:r>
+              <a:rPr lang="en-US" dirty="0">
+                <a:solidFill>
+                  <a:schemeClr val="tx1"/>
+                </a:solidFill>
+                <a:latin typeface="Roboto" panose="02000000000000000000" pitchFamily="2" charset="0"/>
+                <a:ea typeface="Roboto" panose="02000000000000000000" pitchFamily="2" charset="0"/>
+              </a:rPr>
+              <a:t> o </a:t>
+            </a:r>
+            <a:r>
+              <a:rPr lang="en-US" dirty="0" err="1">
+                <a:solidFill>
+                  <a:schemeClr val="tx1"/>
+                </a:solidFill>
+                <a:latin typeface="Roboto" panose="02000000000000000000" pitchFamily="2" charset="0"/>
+                <a:ea typeface="Roboto" panose="02000000000000000000" pitchFamily="2" charset="0"/>
+              </a:rPr>
+              <a:t>mesmo</a:t>
+            </a:r>
+            <a:r>
+              <a:rPr lang="en-US" dirty="0">
+                <a:solidFill>
+                  <a:schemeClr val="tx1"/>
+                </a:solidFill>
+                <a:latin typeface="Roboto" panose="02000000000000000000" pitchFamily="2" charset="0"/>
+                <a:ea typeface="Roboto" panose="02000000000000000000" pitchFamily="2" charset="0"/>
+              </a:rPr>
+              <a:t> </a:t>
+            </a:r>
+            <a:r>
+              <a:rPr lang="en-US" dirty="0" err="1">
+                <a:solidFill>
+                  <a:schemeClr val="tx1"/>
+                </a:solidFill>
+                <a:latin typeface="Roboto" panose="02000000000000000000" pitchFamily="2" charset="0"/>
+                <a:ea typeface="Roboto" panose="02000000000000000000" pitchFamily="2" charset="0"/>
+              </a:rPr>
+              <a:t>ambiente</a:t>
+            </a:r>
+            <a:r>
+              <a:rPr lang="en-US" dirty="0">
+                <a:solidFill>
+                  <a:schemeClr val="tx1"/>
+                </a:solidFill>
+                <a:latin typeface="Roboto" panose="02000000000000000000" pitchFamily="2" charset="0"/>
+                <a:ea typeface="Roboto" panose="02000000000000000000" pitchFamily="2" charset="0"/>
+              </a:rPr>
+              <a:t>;</a:t>
+            </a:r>
+          </a:p>
+          <a:p>
+            <a:pPr marL="285750" indent="-285750">
+              <a:spcAft>
+                <a:spcPts val="1200"/>
+              </a:spcAft>
+              <a:buFont typeface="Arial" panose="020B0604020202020204" pitchFamily="34" charset="0"/>
+              <a:buChar char="•"/>
+            </a:pPr>
+            <a:r>
+              <a:rPr lang="en-US" dirty="0">
+                <a:solidFill>
+                  <a:schemeClr val="tx1"/>
+                </a:solidFill>
+                <a:latin typeface="Roboto" panose="02000000000000000000" pitchFamily="2" charset="0"/>
+                <a:ea typeface="Roboto" panose="02000000000000000000" pitchFamily="2" charset="0"/>
+              </a:rPr>
               <a:t>Kubernetes prove um </a:t>
             </a:r>
             <a:r>
@@ -20291,7 +20295,216 @@
                 <a:latin typeface="Roboto" panose="02000000000000000000" pitchFamily="2" charset="0"/>
                 <a:ea typeface="Roboto" panose="02000000000000000000" pitchFamily="2" charset="0"/>
               </a:rPr>
-              <a:t> um cluster.</a:t>
+              <a:t> um cluster;</a:t>
+            </a:r>
+          </a:p>
+          <a:p>
+            <a:pPr marL="285750" indent="-285750">
+              <a:spcAft>
+                <a:spcPts val="1200"/>
+              </a:spcAft>
+              <a:buFont typeface="Arial" panose="020B0604020202020204" pitchFamily="34" charset="0"/>
+              <a:buChar char="•"/>
+            </a:pPr>
+            <a:r>
+              <a:rPr lang="en-US" dirty="0" err="1">
+                <a:solidFill>
+                  <a:schemeClr val="tx1"/>
+                </a:solidFill>
+                <a:latin typeface="Roboto" panose="02000000000000000000" pitchFamily="2" charset="0"/>
+                <a:ea typeface="Roboto" panose="02000000000000000000" pitchFamily="2" charset="0"/>
+              </a:rPr>
+              <a:t>Foi</a:t>
+            </a:r>
+            <a:r>
+              <a:rPr lang="en-US" dirty="0">
+                <a:solidFill>
+                  <a:schemeClr val="tx1"/>
+                </a:solidFill>
+                <a:latin typeface="Roboto" panose="02000000000000000000" pitchFamily="2" charset="0"/>
+                <a:ea typeface="Roboto" panose="02000000000000000000" pitchFamily="2" charset="0"/>
+              </a:rPr>
+              <a:t> </a:t>
+            </a:r>
+            <a:r>
+              <a:rPr lang="en-US" dirty="0" err="1">
+                <a:solidFill>
+                  <a:schemeClr val="tx1"/>
+                </a:solidFill>
+                <a:latin typeface="Roboto" panose="02000000000000000000" pitchFamily="2" charset="0"/>
+                <a:ea typeface="Roboto" panose="02000000000000000000" pitchFamily="2" charset="0"/>
+              </a:rPr>
+              <a:t>possível</a:t>
+            </a:r>
+            <a:r>
+              <a:rPr lang="en-US" dirty="0">
+                <a:solidFill>
+                  <a:schemeClr val="tx1"/>
+                </a:solidFill>
+                <a:latin typeface="Roboto" panose="02000000000000000000" pitchFamily="2" charset="0"/>
+                <a:ea typeface="Roboto" panose="02000000000000000000" pitchFamily="2" charset="0"/>
+              </a:rPr>
+              <a:t> </a:t>
+            </a:r>
+            <a:r>
+              <a:rPr lang="en-US" dirty="0" err="1">
+                <a:solidFill>
+                  <a:schemeClr val="tx1"/>
+                </a:solidFill>
+                <a:latin typeface="Roboto" panose="02000000000000000000" pitchFamily="2" charset="0"/>
+                <a:ea typeface="Roboto" panose="02000000000000000000" pitchFamily="2" charset="0"/>
+              </a:rPr>
+              <a:t>rodar</a:t>
+            </a:r>
+            <a:r>
+              <a:rPr lang="en-US" dirty="0">
+                <a:solidFill>
+                  <a:schemeClr val="tx1"/>
+                </a:solidFill>
+                <a:latin typeface="Roboto" panose="02000000000000000000" pitchFamily="2" charset="0"/>
+                <a:ea typeface="Roboto" panose="02000000000000000000" pitchFamily="2" charset="0"/>
+              </a:rPr>
+              <a:t> a </a:t>
+            </a:r>
+            <a:r>
+              <a:rPr lang="en-US" dirty="0" err="1">
+                <a:solidFill>
+                  <a:schemeClr val="tx1"/>
+                </a:solidFill>
+                <a:latin typeface="Roboto" panose="02000000000000000000" pitchFamily="2" charset="0"/>
+                <a:ea typeface="Roboto" panose="02000000000000000000" pitchFamily="2" charset="0"/>
+              </a:rPr>
+              <a:t>aplicação</a:t>
+            </a:r>
+            <a:r>
+              <a:rPr lang="en-US" dirty="0">
+                <a:solidFill>
+                  <a:schemeClr val="tx1"/>
+                </a:solidFill>
+                <a:latin typeface="Roboto" panose="02000000000000000000" pitchFamily="2" charset="0"/>
+                <a:ea typeface="Roboto" panose="02000000000000000000" pitchFamily="2" charset="0"/>
+              </a:rPr>
+              <a:t> no </a:t>
+            </a:r>
+            <a:r>
+              <a:rPr lang="en-US" dirty="0" err="1">
+                <a:solidFill>
+                  <a:schemeClr val="tx1"/>
+                </a:solidFill>
+                <a:latin typeface="Roboto" panose="02000000000000000000" pitchFamily="2" charset="0"/>
+                <a:ea typeface="Roboto" panose="02000000000000000000" pitchFamily="2" charset="0"/>
+              </a:rPr>
+              <a:t>ambiente</a:t>
+            </a:r>
+            <a:r>
+              <a:rPr lang="en-US" dirty="0">
+                <a:solidFill>
+                  <a:schemeClr val="tx1"/>
+                </a:solidFill>
+                <a:latin typeface="Roboto" panose="02000000000000000000" pitchFamily="2" charset="0"/>
+                <a:ea typeface="Roboto" panose="02000000000000000000" pitchFamily="2" charset="0"/>
+              </a:rPr>
+              <a:t> k8s e </a:t>
+            </a:r>
+            <a:r>
+              <a:rPr lang="en-US" dirty="0" err="1">
+                <a:solidFill>
+                  <a:schemeClr val="tx1"/>
+                </a:solidFill>
+                <a:latin typeface="Roboto" panose="02000000000000000000" pitchFamily="2" charset="0"/>
+                <a:ea typeface="Roboto" panose="02000000000000000000" pitchFamily="2" charset="0"/>
+              </a:rPr>
+              <a:t>observar</a:t>
+            </a:r>
+            <a:r>
+              <a:rPr lang="en-US" dirty="0">
+                <a:solidFill>
+                  <a:schemeClr val="tx1"/>
+                </a:solidFill>
+                <a:latin typeface="Roboto" panose="02000000000000000000" pitchFamily="2" charset="0"/>
+                <a:ea typeface="Roboto" panose="02000000000000000000" pitchFamily="2" charset="0"/>
+              </a:rPr>
+              <a:t> </a:t>
+            </a:r>
+            <a:r>
+              <a:rPr lang="en-US" dirty="0" err="1">
+                <a:solidFill>
+                  <a:schemeClr val="tx1"/>
+                </a:solidFill>
+                <a:latin typeface="Roboto" panose="02000000000000000000" pitchFamily="2" charset="0"/>
+                <a:ea typeface="Roboto" panose="02000000000000000000" pitchFamily="2" charset="0"/>
+              </a:rPr>
+              <a:t>algumas</a:t>
+            </a:r>
+            <a:r>
+              <a:rPr lang="en-US" dirty="0">
+                <a:solidFill>
+                  <a:schemeClr val="tx1"/>
+                </a:solidFill>
+                <a:latin typeface="Roboto" panose="02000000000000000000" pitchFamily="2" charset="0"/>
+                <a:ea typeface="Roboto" panose="02000000000000000000" pitchFamily="2" charset="0"/>
+              </a:rPr>
+              <a:t> das </a:t>
+            </a:r>
+            <a:r>
+              <a:rPr lang="en-US" dirty="0" err="1">
+                <a:solidFill>
+                  <a:schemeClr val="tx1"/>
+                </a:solidFill>
+                <a:latin typeface="Roboto" panose="02000000000000000000" pitchFamily="2" charset="0"/>
+                <a:ea typeface="Roboto" panose="02000000000000000000" pitchFamily="2" charset="0"/>
+              </a:rPr>
+              <a:t>principais</a:t>
+            </a:r>
+            <a:r>
+              <a:rPr lang="en-US" dirty="0">
+                <a:solidFill>
+                  <a:schemeClr val="tx1"/>
+                </a:solidFill>
+                <a:latin typeface="Roboto" panose="02000000000000000000" pitchFamily="2" charset="0"/>
+                <a:ea typeface="Roboto" panose="02000000000000000000" pitchFamily="2" charset="0"/>
+              </a:rPr>
+              <a:t> </a:t>
+            </a:r>
+            <a:r>
+              <a:rPr lang="en-US" dirty="0" err="1">
+                <a:solidFill>
+                  <a:schemeClr val="tx1"/>
+                </a:solidFill>
+                <a:latin typeface="Roboto" panose="02000000000000000000" pitchFamily="2" charset="0"/>
+                <a:ea typeface="Roboto" panose="02000000000000000000" pitchFamily="2" charset="0"/>
+              </a:rPr>
+              <a:t>características</a:t>
+            </a:r>
+            <a:r>
+              <a:rPr lang="en-US" dirty="0">
+                <a:solidFill>
+                  <a:schemeClr val="tx1"/>
+                </a:solidFill>
+                <a:latin typeface="Roboto" panose="02000000000000000000" pitchFamily="2" charset="0"/>
+                <a:ea typeface="Roboto" panose="02000000000000000000" pitchFamily="2" charset="0"/>
+              </a:rPr>
+              <a:t> </a:t>
+            </a:r>
+            <a:r>
+              <a:rPr lang="en-US" dirty="0" err="1">
+                <a:solidFill>
+                  <a:schemeClr val="tx1"/>
+                </a:solidFill>
+                <a:latin typeface="Roboto" panose="02000000000000000000" pitchFamily="2" charset="0"/>
+                <a:ea typeface="Roboto" panose="02000000000000000000" pitchFamily="2" charset="0"/>
+              </a:rPr>
+              <a:t>disso</a:t>
+            </a:r>
+            <a:r>
+              <a:rPr lang="en-US" dirty="0">
+                <a:solidFill>
+                  <a:schemeClr val="tx1"/>
+                </a:solidFill>
+                <a:latin typeface="Roboto" panose="02000000000000000000" pitchFamily="2" charset="0"/>
+                <a:ea typeface="Roboto" panose="02000000000000000000" pitchFamily="2" charset="0"/>
+              </a:rPr>
+              <a:t>.</a:t>
             </a:r>
           </a:p>
           <a:p>

</xml_diff>